<commit_message>
minor updates - font changes
</commit_message>
<xml_diff>
--- a/Slides/Module 02 From Requirements to Code.pptx
+++ b/Slides/Module 02 From Requirements to Code.pptx
@@ -1374,30 +1374,6 @@
     </pc:docChg>
   </pc:docChgLst>
   <pc:docChgLst>
-    <pc:chgData name="Mitchell Wand" userId="de9b44c55c049659" providerId="LiveId" clId="{ACA31533-D7E5-4647-92CA-20F092EE7CE8}"/>
-    <pc:docChg chg="modSld">
-      <pc:chgData name="Mitchell Wand" userId="de9b44c55c049659" providerId="LiveId" clId="{ACA31533-D7E5-4647-92CA-20F092EE7CE8}" dt="2022-08-31T01:50:01.528" v="0" actId="20577"/>
-      <pc:docMkLst>
-        <pc:docMk/>
-      </pc:docMkLst>
-      <pc:sldChg chg="modSp mod">
-        <pc:chgData name="Mitchell Wand" userId="de9b44c55c049659" providerId="LiveId" clId="{ACA31533-D7E5-4647-92CA-20F092EE7CE8}" dt="2022-08-31T01:50:01.528" v="0" actId="20577"/>
-        <pc:sldMkLst>
-          <pc:docMk/>
-          <pc:sldMk cId="3025610200" sldId="485"/>
-        </pc:sldMkLst>
-        <pc:spChg chg="mod">
-          <ac:chgData name="Mitchell Wand" userId="de9b44c55c049659" providerId="LiveId" clId="{ACA31533-D7E5-4647-92CA-20F092EE7CE8}" dt="2022-08-31T01:50:01.528" v="0" actId="20577"/>
-          <ac:spMkLst>
-            <pc:docMk/>
-            <pc:sldMk cId="3025610200" sldId="485"/>
-            <ac:spMk id="8" creationId="{5B356C44-32EB-4AC4-94B7-A86895491E70}"/>
-          </ac:spMkLst>
-        </pc:spChg>
-      </pc:sldChg>
-    </pc:docChg>
-  </pc:docChgLst>
-  <pc:docChgLst>
     <pc:chgData name="Mitchell Wand" userId="de9b44c55c049659" providerId="LiveId" clId="{2CEF4DC6-0291-4031-B743-2034250D9D86}"/>
     <pc:docChg chg="undo custSel modSld">
       <pc:chgData name="Mitchell Wand" userId="de9b44c55c049659" providerId="LiveId" clId="{2CEF4DC6-0291-4031-B743-2034250D9D86}" dt="2024-08-13T20:46:45.494" v="620" actId="20577"/>
@@ -1455,6 +1431,30 @@
       </pc:sldChg>
     </pc:docChg>
   </pc:docChgLst>
+  <pc:docChgLst>
+    <pc:chgData name="Mitchell Wand" userId="de9b44c55c049659" providerId="LiveId" clId="{ACA31533-D7E5-4647-92CA-20F092EE7CE8}"/>
+    <pc:docChg chg="modSld">
+      <pc:chgData name="Mitchell Wand" userId="de9b44c55c049659" providerId="LiveId" clId="{ACA31533-D7E5-4647-92CA-20F092EE7CE8}" dt="2022-08-31T01:50:01.528" v="0" actId="20577"/>
+      <pc:docMkLst>
+        <pc:docMk/>
+      </pc:docMkLst>
+      <pc:sldChg chg="modSp mod">
+        <pc:chgData name="Mitchell Wand" userId="de9b44c55c049659" providerId="LiveId" clId="{ACA31533-D7E5-4647-92CA-20F092EE7CE8}" dt="2022-08-31T01:50:01.528" v="0" actId="20577"/>
+        <pc:sldMkLst>
+          <pc:docMk/>
+          <pc:sldMk cId="3025610200" sldId="485"/>
+        </pc:sldMkLst>
+        <pc:spChg chg="mod">
+          <ac:chgData name="Mitchell Wand" userId="de9b44c55c049659" providerId="LiveId" clId="{ACA31533-D7E5-4647-92CA-20F092EE7CE8}" dt="2022-08-31T01:50:01.528" v="0" actId="20577"/>
+          <ac:spMkLst>
+            <pc:docMk/>
+            <pc:sldMk cId="3025610200" sldId="485"/>
+            <ac:spMk id="8" creationId="{5B356C44-32EB-4AC4-94B7-A86895491E70}"/>
+          </ac:spMkLst>
+        </pc:spChg>
+      </pc:sldChg>
+    </pc:docChg>
+  </pc:docChgLst>
 </pc:chgInfo>
 </file>
 
@@ -1540,7 +1540,7 @@
           <a:p>
             <a:fld id="{7C7E5181-6CF5-45F7-A87A-E0E0B1FD7549}" type="datetimeFigureOut">
               <a:rPr lang="en-US" smtClean="0"/>
-              <a:t>6/4/2025</a:t>
+              <a:t>8/26/2025</a:t>
             </a:fld>
             <a:endParaRPr lang="en-US"/>
           </a:p>
@@ -3651,13 +3651,8 @@
             </a:br>
             <a:r>
               <a:rPr lang="en-US" dirty="0"/>
-              <a:t>Check out the Module 02 activity page on course website. You will find the starter code and instructions </a:t>
-            </a:r>
-            <a:r>
-              <a:rPr lang="en-US"/>
-              <a:t>there.</a:t>
-            </a:r>
-            <a:endParaRPr lang="en-US" dirty="0"/>
+              <a:t>Check out the Module 02 activity page on course website. You will find the starter code and instructions there.</a:t>
+            </a:r>
           </a:p>
         </p:txBody>
       </p:sp>
@@ -4786,7 +4781,7 @@
           <a:p>
             <a:fld id="{5D2A64DE-480B-420F-9649-4F8E696E08E0}" type="datetime1">
               <a:rPr lang="en-US" smtClean="0"/>
-              <a:t>6/4/2025</a:t>
+              <a:t>8/26/2025</a:t>
             </a:fld>
             <a:endParaRPr lang="en-US"/>
           </a:p>
@@ -5110,7 +5105,7 @@
           <a:p>
             <a:fld id="{EA476A42-A091-4468-A075-64A31BE59948}" type="datetime1">
               <a:rPr lang="en-US" smtClean="0"/>
-              <a:t>6/4/2025</a:t>
+              <a:t>8/26/2025</a:t>
             </a:fld>
             <a:endParaRPr lang="en-US"/>
           </a:p>
@@ -5308,7 +5303,7 @@
           <a:p>
             <a:fld id="{0D3616D0-8311-4107-9726-6B805E7D05BA}" type="datetime1">
               <a:rPr lang="en-US" smtClean="0"/>
-              <a:t>6/4/2025</a:t>
+              <a:t>8/26/2025</a:t>
             </a:fld>
             <a:endParaRPr lang="en-US"/>
           </a:p>
@@ -5516,7 +5511,7 @@
           <a:p>
             <a:fld id="{3BC2557A-5C88-417A-A763-5AC779462A5F}" type="datetime1">
               <a:rPr lang="en-US" smtClean="0"/>
-              <a:t>6/4/2025</a:t>
+              <a:t>8/26/2025</a:t>
             </a:fld>
             <a:endParaRPr lang="en-US"/>
           </a:p>
@@ -6040,7 +6035,7 @@
           <a:p>
             <a:fld id="{07C7BFD4-467E-4EDE-93EA-052F5B39A4E5}" type="datetime1">
               <a:rPr lang="en-US" smtClean="0"/>
-              <a:t>6/4/2025</a:t>
+              <a:t>8/26/2025</a:t>
             </a:fld>
             <a:endParaRPr lang="en-US"/>
           </a:p>
@@ -6290,7 +6285,7 @@
           <a:p>
             <a:fld id="{07C7BFD4-467E-4EDE-93EA-052F5B39A4E5}" type="datetime1">
               <a:rPr lang="en-US" smtClean="0"/>
-              <a:t>6/4/2025</a:t>
+              <a:t>8/26/2025</a:t>
             </a:fld>
             <a:endParaRPr lang="en-US"/>
           </a:p>
@@ -6472,7 +6467,7 @@
           <a:p>
             <a:fld id="{109E55A0-C911-4F03-82FC-7E5926047D46}" type="datetime1">
               <a:rPr lang="en-US" smtClean="0"/>
-              <a:t>6/4/2025</a:t>
+              <a:t>8/26/2025</a:t>
             </a:fld>
             <a:endParaRPr lang="en-US"/>
           </a:p>
@@ -6785,7 +6780,7 @@
           <a:p>
             <a:fld id="{A533CBE2-D5BE-47AC-ADC2-9CDFC1D0CF90}" type="datetime1">
               <a:rPr lang="en-US" smtClean="0"/>
-              <a:t>6/4/2025</a:t>
+              <a:t>8/26/2025</a:t>
             </a:fld>
             <a:endParaRPr lang="en-US"/>
           </a:p>
@@ -7086,7 +7081,7 @@
           <a:p>
             <a:fld id="{39B7EDB1-CE74-4951-85A2-0B01C2128E28}" type="datetime1">
               <a:rPr lang="en-US" smtClean="0"/>
-              <a:t>6/4/2025</a:t>
+              <a:t>8/26/2025</a:t>
             </a:fld>
             <a:endParaRPr lang="en-US"/>
           </a:p>
@@ -7534,7 +7529,7 @@
           <a:p>
             <a:fld id="{2BC7EB92-A5C2-4807-A9DC-9EDE6CBFB241}" type="datetime1">
               <a:rPr lang="en-US" smtClean="0"/>
-              <a:t>6/4/2025</a:t>
+              <a:t>8/26/2025</a:t>
             </a:fld>
             <a:endParaRPr lang="en-US"/>
           </a:p>
@@ -7647,7 +7642,7 @@
           <a:p>
             <a:fld id="{2B7B7EE0-7771-4CD5-9B2B-3550753A54A1}" type="datetime1">
               <a:rPr lang="en-US" smtClean="0"/>
-              <a:t>6/4/2025</a:t>
+              <a:t>8/26/2025</a:t>
             </a:fld>
             <a:endParaRPr lang="en-US"/>
           </a:p>
@@ -7958,7 +7953,7 @@
           <a:p>
             <a:fld id="{F8B318B3-0E87-4416-A9B8-D891968C2727}" type="datetime1">
               <a:rPr lang="en-US" smtClean="0"/>
-              <a:t>6/4/2025</a:t>
+              <a:t>8/26/2025</a:t>
             </a:fld>
             <a:endParaRPr lang="en-US"/>
           </a:p>
@@ -8199,7 +8194,7 @@
           <a:p>
             <a:fld id="{54D997E8-DDEE-43F1-8D9B-F8A1E11DE488}" type="datetime1">
               <a:rPr lang="en-US" smtClean="0"/>
-              <a:t>6/4/2025</a:t>
+              <a:t>8/26/2025</a:t>
             </a:fld>
             <a:endParaRPr lang="en-US"/>
           </a:p>
@@ -10692,8 +10687,8 @@
         </p:nvSpPr>
         <p:spPr>
           <a:xfrm>
-            <a:off x="185057" y="1681347"/>
-            <a:ext cx="12006943" cy="4278094"/>
+            <a:off x="651353" y="1502688"/>
+            <a:ext cx="12050038" cy="5016758"/>
           </a:xfrm>
           <a:prstGeom prst="rect">
             <a:avLst/>
@@ -10978,6 +10973,20 @@
               </a:rPr>
               <a:t>    </a:t>
             </a:r>
+          </a:p>
+          <a:p>
+            <a:pPr>
+              <a:buNone/>
+            </a:pPr>
+            <a:r>
+              <a:rPr lang="en-US" sz="1600" dirty="0">
+                <a:solidFill>
+                  <a:srgbClr val="000000"/>
+                </a:solidFill>
+                <a:latin typeface="Consolas" panose="020B0609020204030204" pitchFamily="49" charset="0"/>
+              </a:rPr>
+              <a:t>    </a:t>
+            </a:r>
             <a:r>
               <a:rPr lang="en-US" sz="1600" b="0" dirty="0" err="1">
                 <a:solidFill>
@@ -11120,91 +11129,101 @@
               </a:rPr>
               <a:t>    </a:t>
             </a:r>
-            <a:r>
-              <a:rPr lang="en-US" sz="1600" b="0" dirty="0" err="1">
-                <a:solidFill>
-                  <a:srgbClr val="000000"/>
-                </a:solidFill>
-                <a:effectLst/>
-                <a:latin typeface="Consolas" panose="020B0609020204030204" pitchFamily="49" charset="0"/>
-              </a:rPr>
-              <a:t>deleteStudent</a:t>
-            </a:r>
-            <a:r>
-              <a:rPr lang="en-US" sz="1600" b="0" dirty="0">
-                <a:solidFill>
-                  <a:srgbClr val="000000"/>
-                </a:solidFill>
-                <a:effectLst/>
-                <a:latin typeface="Consolas" panose="020B0609020204030204" pitchFamily="49" charset="0"/>
-              </a:rPr>
-              <a:t>(</a:t>
-            </a:r>
-            <a:r>
-              <a:rPr lang="en-US" sz="1600" b="0" dirty="0" err="1">
-                <a:solidFill>
-                  <a:srgbClr val="000000"/>
-                </a:solidFill>
-                <a:effectLst/>
-                <a:latin typeface="Consolas" panose="020B0609020204030204" pitchFamily="49" charset="0"/>
-              </a:rPr>
-              <a:t>studentID</a:t>
-            </a:r>
-            <a:r>
-              <a:rPr lang="en-US" sz="1600" b="0" dirty="0">
-                <a:solidFill>
-                  <a:srgbClr val="000000"/>
-                </a:solidFill>
-                <a:effectLst/>
-                <a:latin typeface="Consolas" panose="020B0609020204030204" pitchFamily="49" charset="0"/>
-              </a:rPr>
-              <a:t>: </a:t>
-            </a:r>
-            <a:r>
-              <a:rPr lang="en-US" sz="1600" b="0" dirty="0" err="1">
-                <a:solidFill>
-                  <a:srgbClr val="000000"/>
-                </a:solidFill>
-                <a:effectLst/>
-                <a:latin typeface="Consolas" panose="020B0609020204030204" pitchFamily="49" charset="0"/>
-              </a:rPr>
-              <a:t>StudentID</a:t>
-            </a:r>
-            <a:r>
-              <a:rPr lang="en-US" sz="1600" b="0" dirty="0">
-                <a:solidFill>
-                  <a:srgbClr val="000000"/>
-                </a:solidFill>
-                <a:effectLst/>
-                <a:latin typeface="Consolas" panose="020B0609020204030204" pitchFamily="49" charset="0"/>
-              </a:rPr>
-              <a:t>, name: </a:t>
-            </a:r>
-            <a:r>
-              <a:rPr lang="en-US" sz="1600" b="0" dirty="0" err="1">
-                <a:solidFill>
-                  <a:srgbClr val="000000"/>
-                </a:solidFill>
-                <a:effectLst/>
-                <a:latin typeface="Consolas" panose="020B0609020204030204" pitchFamily="49" charset="0"/>
-              </a:rPr>
-              <a:t>StudentName</a:t>
-            </a:r>
-            <a:r>
-              <a:rPr lang="en-US" sz="1600" b="0" dirty="0">
-                <a:solidFill>
-                  <a:srgbClr val="000000"/>
-                </a:solidFill>
-                <a:effectLst/>
-                <a:latin typeface="Consolas" panose="020B0609020204030204" pitchFamily="49" charset="0"/>
-              </a:rPr>
-              <a:t>): void;</a:t>
-            </a:r>
           </a:p>
           <a:p>
             <a:pPr>
               <a:buNone/>
             </a:pPr>
+            <a:r>
+              <a:rPr lang="en-US" sz="1600" b="0" dirty="0">
+                <a:solidFill>
+                  <a:srgbClr val="000000"/>
+                </a:solidFill>
+                <a:effectLst/>
+                <a:latin typeface="Consolas" panose="020B0609020204030204" pitchFamily="49" charset="0"/>
+              </a:rPr>
+              <a:t>    </a:t>
+            </a:r>
+            <a:r>
+              <a:rPr lang="en-US" sz="1600" b="0" dirty="0" err="1">
+                <a:solidFill>
+                  <a:srgbClr val="000000"/>
+                </a:solidFill>
+                <a:effectLst/>
+                <a:latin typeface="Consolas" panose="020B0609020204030204" pitchFamily="49" charset="0"/>
+              </a:rPr>
+              <a:t>deleteStudent</a:t>
+            </a:r>
+            <a:r>
+              <a:rPr lang="en-US" sz="1600" b="0" dirty="0">
+                <a:solidFill>
+                  <a:srgbClr val="000000"/>
+                </a:solidFill>
+                <a:effectLst/>
+                <a:latin typeface="Consolas" panose="020B0609020204030204" pitchFamily="49" charset="0"/>
+              </a:rPr>
+              <a:t>(</a:t>
+            </a:r>
+            <a:r>
+              <a:rPr lang="en-US" sz="1600" b="0" dirty="0" err="1">
+                <a:solidFill>
+                  <a:srgbClr val="000000"/>
+                </a:solidFill>
+                <a:effectLst/>
+                <a:latin typeface="Consolas" panose="020B0609020204030204" pitchFamily="49" charset="0"/>
+              </a:rPr>
+              <a:t>studentID</a:t>
+            </a:r>
+            <a:r>
+              <a:rPr lang="en-US" sz="1600" b="0" dirty="0">
+                <a:solidFill>
+                  <a:srgbClr val="000000"/>
+                </a:solidFill>
+                <a:effectLst/>
+                <a:latin typeface="Consolas" panose="020B0609020204030204" pitchFamily="49" charset="0"/>
+              </a:rPr>
+              <a:t>: </a:t>
+            </a:r>
+            <a:r>
+              <a:rPr lang="en-US" sz="1600" b="0" dirty="0" err="1">
+                <a:solidFill>
+                  <a:srgbClr val="000000"/>
+                </a:solidFill>
+                <a:effectLst/>
+                <a:latin typeface="Consolas" panose="020B0609020204030204" pitchFamily="49" charset="0"/>
+              </a:rPr>
+              <a:t>StudentID</a:t>
+            </a:r>
+            <a:r>
+              <a:rPr lang="en-US" sz="1600" b="0" dirty="0">
+                <a:solidFill>
+                  <a:srgbClr val="000000"/>
+                </a:solidFill>
+                <a:effectLst/>
+                <a:latin typeface="Consolas" panose="020B0609020204030204" pitchFamily="49" charset="0"/>
+              </a:rPr>
+              <a:t>, name: </a:t>
+            </a:r>
+            <a:r>
+              <a:rPr lang="en-US" sz="1600" b="0" dirty="0" err="1">
+                <a:solidFill>
+                  <a:srgbClr val="000000"/>
+                </a:solidFill>
+                <a:effectLst/>
+                <a:latin typeface="Consolas" panose="020B0609020204030204" pitchFamily="49" charset="0"/>
+              </a:rPr>
+              <a:t>StudentName</a:t>
+            </a:r>
+            <a:r>
+              <a:rPr lang="en-US" sz="1600" b="0" dirty="0">
+                <a:solidFill>
+                  <a:srgbClr val="000000"/>
+                </a:solidFill>
+                <a:effectLst/>
+                <a:latin typeface="Consolas" panose="020B0609020204030204" pitchFamily="49" charset="0"/>
+              </a:rPr>
+              <a:t>): void;</a:t>
+            </a:r>
             <a:br>
               <a:rPr lang="en-US" sz="1600" b="0" dirty="0">
                 <a:solidFill>
@@ -11223,86 +11242,6 @@
                 <a:latin typeface="Consolas" panose="020B0609020204030204" pitchFamily="49" charset="0"/>
               </a:rPr>
               <a:t>    </a:t>
-            </a:r>
-            <a:r>
-              <a:rPr lang="en-US" sz="1600" b="0" dirty="0" err="1">
-                <a:solidFill>
-                  <a:srgbClr val="000000"/>
-                </a:solidFill>
-                <a:effectLst/>
-                <a:latin typeface="Consolas" panose="020B0609020204030204" pitchFamily="49" charset="0"/>
-              </a:rPr>
-              <a:t>getTranscript</a:t>
-            </a:r>
-            <a:r>
-              <a:rPr lang="en-US" sz="1600" b="0" dirty="0">
-                <a:solidFill>
-                  <a:srgbClr val="000000"/>
-                </a:solidFill>
-                <a:effectLst/>
-                <a:latin typeface="Consolas" panose="020B0609020204030204" pitchFamily="49" charset="0"/>
-              </a:rPr>
-              <a:t>(</a:t>
-            </a:r>
-            <a:r>
-              <a:rPr lang="en-US" sz="1600" b="0" dirty="0" err="1">
-                <a:solidFill>
-                  <a:srgbClr val="000000"/>
-                </a:solidFill>
-                <a:effectLst/>
-                <a:latin typeface="Consolas" panose="020B0609020204030204" pitchFamily="49" charset="0"/>
-              </a:rPr>
-              <a:t>studentID</a:t>
-            </a:r>
-            <a:r>
-              <a:rPr lang="en-US" sz="1600" b="0" dirty="0">
-                <a:solidFill>
-                  <a:srgbClr val="000000"/>
-                </a:solidFill>
-                <a:effectLst/>
-                <a:latin typeface="Consolas" panose="020B0609020204030204" pitchFamily="49" charset="0"/>
-              </a:rPr>
-              <a:t>: </a:t>
-            </a:r>
-            <a:r>
-              <a:rPr lang="en-US" sz="1600" b="0" dirty="0" err="1">
-                <a:solidFill>
-                  <a:srgbClr val="000000"/>
-                </a:solidFill>
-                <a:effectLst/>
-                <a:latin typeface="Consolas" panose="020B0609020204030204" pitchFamily="49" charset="0"/>
-              </a:rPr>
-              <a:t>StudentID</a:t>
-            </a:r>
-            <a:r>
-              <a:rPr lang="en-US" sz="1600" b="0" dirty="0">
-                <a:solidFill>
-                  <a:srgbClr val="000000"/>
-                </a:solidFill>
-                <a:effectLst/>
-                <a:latin typeface="Consolas" panose="020B0609020204030204" pitchFamily="49" charset="0"/>
-              </a:rPr>
-              <a:t>, </a:t>
-            </a:r>
-            <a:r>
-              <a:rPr lang="en-US" sz="1600" b="0" dirty="0" err="1">
-                <a:solidFill>
-                  <a:srgbClr val="000000"/>
-                </a:solidFill>
-                <a:effectLst/>
-                <a:latin typeface="Consolas" panose="020B0609020204030204" pitchFamily="49" charset="0"/>
-              </a:rPr>
-              <a:t>name:StudentName</a:t>
-            </a:r>
-            <a:r>
-              <a:rPr lang="en-US" sz="1600" b="0" dirty="0">
-                <a:solidFill>
-                  <a:srgbClr val="000000"/>
-                </a:solidFill>
-                <a:effectLst/>
-                <a:latin typeface="Consolas" panose="020B0609020204030204" pitchFamily="49" charset="0"/>
-              </a:rPr>
-              <a:t>): Transcript;</a:t>
             </a:r>
           </a:p>
           <a:p>
@@ -11310,6 +11249,25 @@
               <a:buNone/>
             </a:pPr>
             <a:r>
+              <a:rPr lang="en-US" sz="1600" dirty="0">
+                <a:solidFill>
+                  <a:srgbClr val="000000"/>
+                </a:solidFill>
+                <a:latin typeface="Consolas" panose="020B0609020204030204" pitchFamily="49" charset="0"/>
+              </a:rPr>
+              <a:t>    </a:t>
+            </a:r>
+            <a:r>
+              <a:rPr lang="en-US" sz="1600" b="0" dirty="0" err="1">
+                <a:solidFill>
+                  <a:srgbClr val="000000"/>
+                </a:solidFill>
+                <a:effectLst/>
+                <a:latin typeface="Consolas" panose="020B0609020204030204" pitchFamily="49" charset="0"/>
+              </a:rPr>
+              <a:t>getTranscript</a:t>
+            </a:r>
+            <a:r>
               <a:rPr lang="en-US" sz="1600" b="0" dirty="0">
                 <a:solidFill>
                   <a:srgbClr val="000000"/>
@@ -11317,7 +11275,67 @@
                 <a:effectLst/>
                 <a:latin typeface="Consolas" panose="020B0609020204030204" pitchFamily="49" charset="0"/>
               </a:rPr>
-              <a:t> </a:t>
+              <a:t>(</a:t>
+            </a:r>
+            <a:r>
+              <a:rPr lang="en-US" sz="1600" b="0" dirty="0" err="1">
+                <a:solidFill>
+                  <a:srgbClr val="000000"/>
+                </a:solidFill>
+                <a:effectLst/>
+                <a:latin typeface="Consolas" panose="020B0609020204030204" pitchFamily="49" charset="0"/>
+              </a:rPr>
+              <a:t>studentID</a:t>
+            </a:r>
+            <a:r>
+              <a:rPr lang="en-US" sz="1600" b="0" dirty="0">
+                <a:solidFill>
+                  <a:srgbClr val="000000"/>
+                </a:solidFill>
+                <a:effectLst/>
+                <a:latin typeface="Consolas" panose="020B0609020204030204" pitchFamily="49" charset="0"/>
+              </a:rPr>
+              <a:t>: </a:t>
+            </a:r>
+            <a:r>
+              <a:rPr lang="en-US" sz="1600" b="0" dirty="0" err="1">
+                <a:solidFill>
+                  <a:srgbClr val="000000"/>
+                </a:solidFill>
+                <a:effectLst/>
+                <a:latin typeface="Consolas" panose="020B0609020204030204" pitchFamily="49" charset="0"/>
+              </a:rPr>
+              <a:t>StudentID</a:t>
+            </a:r>
+            <a:r>
+              <a:rPr lang="en-US" sz="1600" b="0" dirty="0">
+                <a:solidFill>
+                  <a:srgbClr val="000000"/>
+                </a:solidFill>
+                <a:effectLst/>
+                <a:latin typeface="Consolas" panose="020B0609020204030204" pitchFamily="49" charset="0"/>
+              </a:rPr>
+              <a:t>, </a:t>
+            </a:r>
+            <a:r>
+              <a:rPr lang="en-US" sz="1600" b="0" dirty="0" err="1">
+                <a:solidFill>
+                  <a:srgbClr val="000000"/>
+                </a:solidFill>
+                <a:effectLst/>
+                <a:latin typeface="Consolas" panose="020B0609020204030204" pitchFamily="49" charset="0"/>
+              </a:rPr>
+              <a:t>name:StudentName</a:t>
+            </a:r>
+            <a:r>
+              <a:rPr lang="en-US" sz="1600" b="0" dirty="0">
+                <a:solidFill>
+                  <a:srgbClr val="000000"/>
+                </a:solidFill>
+                <a:effectLst/>
+                <a:latin typeface="Consolas" panose="020B0609020204030204" pitchFamily="49" charset="0"/>
+              </a:rPr>
+              <a:t>): Transcript;</a:t>
             </a:r>
           </a:p>
           <a:p>
@@ -11334,152 +11352,31 @@
               </a:rPr>
               <a:t>    </a:t>
             </a:r>
-            <a:r>
-              <a:rPr lang="en-US" sz="1600" b="0" dirty="0" err="1">
-                <a:solidFill>
-                  <a:srgbClr val="000000"/>
-                </a:solidFill>
-                <a:effectLst/>
-                <a:latin typeface="Consolas" panose="020B0609020204030204" pitchFamily="49" charset="0"/>
-              </a:rPr>
-              <a:t>addGrade</a:t>
-            </a:r>
-            <a:r>
-              <a:rPr lang="en-US" sz="1600" b="0" dirty="0">
-                <a:solidFill>
-                  <a:srgbClr val="000000"/>
-                </a:solidFill>
-                <a:effectLst/>
-                <a:latin typeface="Consolas" panose="020B0609020204030204" pitchFamily="49" charset="0"/>
-              </a:rPr>
-              <a:t>(</a:t>
-            </a:r>
-            <a:r>
-              <a:rPr lang="en-US" sz="1600" b="0" dirty="0" err="1">
-                <a:solidFill>
-                  <a:srgbClr val="000000"/>
-                </a:solidFill>
-                <a:effectLst/>
-                <a:latin typeface="Consolas" panose="020B0609020204030204" pitchFamily="49" charset="0"/>
-              </a:rPr>
-              <a:t>studentID</a:t>
-            </a:r>
-            <a:r>
-              <a:rPr lang="en-US" sz="1600" b="0" dirty="0">
-                <a:solidFill>
-                  <a:srgbClr val="000000"/>
-                </a:solidFill>
-                <a:effectLst/>
-                <a:latin typeface="Consolas" panose="020B0609020204030204" pitchFamily="49" charset="0"/>
-              </a:rPr>
-              <a:t>: </a:t>
-            </a:r>
-            <a:r>
-              <a:rPr lang="en-US" sz="1600" b="0" dirty="0" err="1">
-                <a:solidFill>
-                  <a:srgbClr val="000000"/>
-                </a:solidFill>
-                <a:effectLst/>
-                <a:latin typeface="Consolas" panose="020B0609020204030204" pitchFamily="49" charset="0"/>
-              </a:rPr>
-              <a:t>StudentID</a:t>
-            </a:r>
-            <a:r>
-              <a:rPr lang="en-US" sz="1600" b="0" dirty="0">
-                <a:solidFill>
-                  <a:srgbClr val="000000"/>
-                </a:solidFill>
-                <a:effectLst/>
-                <a:latin typeface="Consolas" panose="020B0609020204030204" pitchFamily="49" charset="0"/>
-              </a:rPr>
-              <a:t>, </a:t>
-            </a:r>
-            <a:r>
-              <a:rPr lang="en-US" sz="1600" b="0" dirty="0" err="1">
-                <a:solidFill>
-                  <a:srgbClr val="000000"/>
-                </a:solidFill>
-                <a:effectLst/>
-                <a:latin typeface="Consolas" panose="020B0609020204030204" pitchFamily="49" charset="0"/>
-              </a:rPr>
-              <a:t>studentName</a:t>
-            </a:r>
-            <a:r>
-              <a:rPr lang="en-US" sz="1600" b="0" dirty="0">
-                <a:solidFill>
-                  <a:srgbClr val="000000"/>
-                </a:solidFill>
-                <a:effectLst/>
-                <a:latin typeface="Consolas" panose="020B0609020204030204" pitchFamily="49" charset="0"/>
-              </a:rPr>
-              <a:t>: </a:t>
-            </a:r>
-            <a:r>
-              <a:rPr lang="en-US" sz="1600" b="0" dirty="0" err="1">
-                <a:solidFill>
-                  <a:srgbClr val="000000"/>
-                </a:solidFill>
-                <a:effectLst/>
-                <a:latin typeface="Consolas" panose="020B0609020204030204" pitchFamily="49" charset="0"/>
-              </a:rPr>
-              <a:t>StudentName</a:t>
-            </a:r>
-            <a:r>
-              <a:rPr lang="en-US" sz="1600" b="0" dirty="0">
-                <a:solidFill>
-                  <a:srgbClr val="000000"/>
-                </a:solidFill>
-                <a:effectLst/>
-                <a:latin typeface="Consolas" panose="020B0609020204030204" pitchFamily="49" charset="0"/>
-              </a:rPr>
-              <a:t>, </a:t>
-            </a:r>
-            <a:r>
-              <a:rPr lang="en-US" sz="1600" b="0" dirty="0" err="1">
-                <a:solidFill>
-                  <a:srgbClr val="000000"/>
-                </a:solidFill>
-                <a:effectLst/>
-                <a:latin typeface="Consolas" panose="020B0609020204030204" pitchFamily="49" charset="0"/>
-              </a:rPr>
-              <a:t>courseID</a:t>
-            </a:r>
-            <a:r>
-              <a:rPr lang="en-US" sz="1600" b="0" dirty="0">
-                <a:solidFill>
-                  <a:srgbClr val="000000"/>
-                </a:solidFill>
-                <a:effectLst/>
-                <a:latin typeface="Consolas" panose="020B0609020204030204" pitchFamily="49" charset="0"/>
-              </a:rPr>
-              <a:t>: </a:t>
-            </a:r>
-            <a:r>
-              <a:rPr lang="en-US" sz="1600" b="0" dirty="0" err="1">
-                <a:solidFill>
-                  <a:srgbClr val="000000"/>
-                </a:solidFill>
-                <a:effectLst/>
-                <a:latin typeface="Consolas" panose="020B0609020204030204" pitchFamily="49" charset="0"/>
-              </a:rPr>
-              <a:t>CourseID</a:t>
-            </a:r>
-            <a:r>
-              <a:rPr lang="en-US" sz="1600" b="0" dirty="0">
-                <a:solidFill>
-                  <a:srgbClr val="000000"/>
-                </a:solidFill>
-                <a:effectLst/>
-                <a:latin typeface="Consolas" panose="020B0609020204030204" pitchFamily="49" charset="0"/>
-              </a:rPr>
-              <a:t>, grade: Grade): void</a:t>
-            </a:r>
           </a:p>
           <a:p>
             <a:pPr>
               <a:buNone/>
             </a:pPr>
             <a:r>
+              <a:rPr lang="en-US" sz="1600" dirty="0">
+                <a:solidFill>
+                  <a:srgbClr val="000000"/>
+                </a:solidFill>
+                <a:latin typeface="Consolas" panose="020B0609020204030204" pitchFamily="49" charset="0"/>
+              </a:rPr>
+              <a:t>    </a:t>
+            </a:r>
+            <a:r>
+              <a:rPr lang="en-US" sz="1600" b="0" dirty="0" err="1">
+                <a:solidFill>
+                  <a:srgbClr val="000000"/>
+                </a:solidFill>
+                <a:effectLst/>
+                <a:latin typeface="Consolas" panose="020B0609020204030204" pitchFamily="49" charset="0"/>
+              </a:rPr>
+              <a:t>addGrade</a:t>
+            </a:r>
+            <a:r>
               <a:rPr lang="en-US" sz="1600" b="0" dirty="0">
                 <a:solidFill>
                   <a:srgbClr val="000000"/>
@@ -11487,7 +11384,7 @@
                 <a:effectLst/>
                 <a:latin typeface="Consolas" panose="020B0609020204030204" pitchFamily="49" charset="0"/>
               </a:rPr>
-              <a:t>    </a:t>
+              <a:t>(</a:t>
             </a:r>
             <a:r>
               <a:rPr lang="en-US" sz="1600" b="0" dirty="0" err="1">
@@ -11497,7 +11394,7 @@
                 <a:effectLst/>
                 <a:latin typeface="Consolas" panose="020B0609020204030204" pitchFamily="49" charset="0"/>
               </a:rPr>
-              <a:t>getGrade</a:t>
+              <a:t>studentID</a:t>
             </a:r>
             <a:r>
               <a:rPr lang="en-US" sz="1600" b="0" dirty="0">
@@ -11507,7 +11404,7 @@
                 <a:effectLst/>
                 <a:latin typeface="Consolas" panose="020B0609020204030204" pitchFamily="49" charset="0"/>
               </a:rPr>
-              <a:t>(</a:t>
+              <a:t>: </a:t>
             </a:r>
             <a:r>
               <a:rPr lang="en-US" sz="1600" b="0" dirty="0" err="1">
@@ -11517,7 +11414,7 @@
                 <a:effectLst/>
                 <a:latin typeface="Consolas" panose="020B0609020204030204" pitchFamily="49" charset="0"/>
               </a:rPr>
-              <a:t>studentID</a:t>
+              <a:t>StudentID</a:t>
             </a:r>
             <a:r>
               <a:rPr lang="en-US" sz="1600" b="0" dirty="0">
@@ -11527,6 +11424,26 @@
                 <a:effectLst/>
                 <a:latin typeface="Consolas" panose="020B0609020204030204" pitchFamily="49" charset="0"/>
               </a:rPr>
+              <a:t>, </a:t>
+            </a:r>
+            <a:r>
+              <a:rPr lang="en-US" sz="1600" b="0" dirty="0" err="1">
+                <a:solidFill>
+                  <a:srgbClr val="000000"/>
+                </a:solidFill>
+                <a:effectLst/>
+                <a:latin typeface="Consolas" panose="020B0609020204030204" pitchFamily="49" charset="0"/>
+              </a:rPr>
+              <a:t>studentName</a:t>
+            </a:r>
+            <a:r>
+              <a:rPr lang="en-US" sz="1600" b="0" dirty="0">
+                <a:solidFill>
+                  <a:srgbClr val="000000"/>
+                </a:solidFill>
+                <a:effectLst/>
+                <a:latin typeface="Consolas" panose="020B0609020204030204" pitchFamily="49" charset="0"/>
+              </a:rPr>
               <a:t>: </a:t>
             </a:r>
             <a:r>
@@ -11537,7 +11454,7 @@
                 <a:effectLst/>
                 <a:latin typeface="Consolas" panose="020B0609020204030204" pitchFamily="49" charset="0"/>
               </a:rPr>
-              <a:t>StudentID</a:t>
+              <a:t>StudentName</a:t>
             </a:r>
             <a:r>
               <a:rPr lang="en-US" sz="1600" b="0" dirty="0">
@@ -11557,7 +11474,7 @@
                 <a:effectLst/>
                 <a:latin typeface="Consolas" panose="020B0609020204030204" pitchFamily="49" charset="0"/>
               </a:rPr>
-              <a:t>studentName</a:t>
+              <a:t>courseID</a:t>
             </a:r>
             <a:r>
               <a:rPr lang="en-US" sz="1600" b="0" dirty="0">
@@ -11577,7 +11494,7 @@
                 <a:effectLst/>
                 <a:latin typeface="Consolas" panose="020B0609020204030204" pitchFamily="49" charset="0"/>
               </a:rPr>
-              <a:t>StudentName</a:t>
+              <a:t>CourseID</a:t>
             </a:r>
             <a:r>
               <a:rPr lang="en-US" sz="1600" b="0" dirty="0">
@@ -11587,47 +11504,7 @@
                 <a:effectLst/>
                 <a:latin typeface="Consolas" panose="020B0609020204030204" pitchFamily="49" charset="0"/>
               </a:rPr>
-              <a:t>, </a:t>
-            </a:r>
-            <a:r>
-              <a:rPr lang="en-US" sz="1600" b="0" dirty="0" err="1">
-                <a:solidFill>
-                  <a:srgbClr val="000000"/>
-                </a:solidFill>
-                <a:effectLst/>
-                <a:latin typeface="Consolas" panose="020B0609020204030204" pitchFamily="49" charset="0"/>
-              </a:rPr>
-              <a:t>courseID</a:t>
-            </a:r>
-            <a:r>
-              <a:rPr lang="en-US" sz="1600" b="0" dirty="0">
-                <a:solidFill>
-                  <a:srgbClr val="000000"/>
-                </a:solidFill>
-                <a:effectLst/>
-                <a:latin typeface="Consolas" panose="020B0609020204030204" pitchFamily="49" charset="0"/>
-              </a:rPr>
-              <a:t>: </a:t>
-            </a:r>
-            <a:r>
-              <a:rPr lang="en-US" sz="1600" b="0" dirty="0" err="1">
-                <a:solidFill>
-                  <a:srgbClr val="000000"/>
-                </a:solidFill>
-                <a:effectLst/>
-                <a:latin typeface="Consolas" panose="020B0609020204030204" pitchFamily="49" charset="0"/>
-              </a:rPr>
-              <a:t>CourseID</a:t>
-            </a:r>
-            <a:r>
-              <a:rPr lang="en-US" sz="1600" b="0" dirty="0">
-                <a:solidFill>
-                  <a:srgbClr val="000000"/>
-                </a:solidFill>
-                <a:effectLst/>
-                <a:latin typeface="Consolas" panose="020B0609020204030204" pitchFamily="49" charset="0"/>
-              </a:rPr>
-              <a:t>): Grade</a:t>
+              <a:t>, grade: Grade): void</a:t>
             </a:r>
           </a:p>
           <a:p>
@@ -11650,6 +11527,25 @@
               <a:buNone/>
             </a:pPr>
             <a:r>
+              <a:rPr lang="en-US" sz="1600" dirty="0">
+                <a:solidFill>
+                  <a:srgbClr val="000000"/>
+                </a:solidFill>
+                <a:latin typeface="Consolas" panose="020B0609020204030204" pitchFamily="49" charset="0"/>
+              </a:rPr>
+              <a:t>    </a:t>
+            </a:r>
+            <a:r>
+              <a:rPr lang="en-US" sz="1600" b="0" dirty="0" err="1">
+                <a:solidFill>
+                  <a:srgbClr val="000000"/>
+                </a:solidFill>
+                <a:effectLst/>
+                <a:latin typeface="Consolas" panose="020B0609020204030204" pitchFamily="49" charset="0"/>
+              </a:rPr>
+              <a:t>getGrade</a:t>
+            </a:r>
+            <a:r>
               <a:rPr lang="en-US" sz="1600" b="0" dirty="0">
                 <a:solidFill>
                   <a:srgbClr val="000000"/>
@@ -11657,7 +11553,156 @@
                 <a:effectLst/>
                 <a:latin typeface="Consolas" panose="020B0609020204030204" pitchFamily="49" charset="0"/>
               </a:rPr>
+              <a:t>(</a:t>
+            </a:r>
+            <a:r>
+              <a:rPr lang="en-US" sz="1600" b="0" dirty="0" err="1">
+                <a:solidFill>
+                  <a:srgbClr val="000000"/>
+                </a:solidFill>
+                <a:effectLst/>
+                <a:latin typeface="Consolas" panose="020B0609020204030204" pitchFamily="49" charset="0"/>
+              </a:rPr>
+              <a:t>studentID</a:t>
+            </a:r>
+            <a:r>
+              <a:rPr lang="en-US" sz="1600" b="0" dirty="0">
+                <a:solidFill>
+                  <a:srgbClr val="000000"/>
+                </a:solidFill>
+                <a:effectLst/>
+                <a:latin typeface="Consolas" panose="020B0609020204030204" pitchFamily="49" charset="0"/>
+              </a:rPr>
+              <a:t>: </a:t>
+            </a:r>
+            <a:r>
+              <a:rPr lang="en-US" sz="1600" b="0" dirty="0" err="1">
+                <a:solidFill>
+                  <a:srgbClr val="000000"/>
+                </a:solidFill>
+                <a:effectLst/>
+                <a:latin typeface="Consolas" panose="020B0609020204030204" pitchFamily="49" charset="0"/>
+              </a:rPr>
+              <a:t>StudentID</a:t>
+            </a:r>
+            <a:r>
+              <a:rPr lang="en-US" sz="1600" b="0" dirty="0">
+                <a:solidFill>
+                  <a:srgbClr val="000000"/>
+                </a:solidFill>
+                <a:effectLst/>
+                <a:latin typeface="Consolas" panose="020B0609020204030204" pitchFamily="49" charset="0"/>
+              </a:rPr>
+              <a:t>, </a:t>
+            </a:r>
+            <a:r>
+              <a:rPr lang="en-US" sz="1600" b="0" dirty="0" err="1">
+                <a:solidFill>
+                  <a:srgbClr val="000000"/>
+                </a:solidFill>
+                <a:effectLst/>
+                <a:latin typeface="Consolas" panose="020B0609020204030204" pitchFamily="49" charset="0"/>
+              </a:rPr>
+              <a:t>studentName</a:t>
+            </a:r>
+            <a:r>
+              <a:rPr lang="en-US" sz="1600" b="0" dirty="0">
+                <a:solidFill>
+                  <a:srgbClr val="000000"/>
+                </a:solidFill>
+                <a:effectLst/>
+                <a:latin typeface="Consolas" panose="020B0609020204030204" pitchFamily="49" charset="0"/>
+              </a:rPr>
+              <a:t>: </a:t>
+            </a:r>
+            <a:r>
+              <a:rPr lang="en-US" sz="1600" b="0" dirty="0" err="1">
+                <a:solidFill>
+                  <a:srgbClr val="000000"/>
+                </a:solidFill>
+                <a:effectLst/>
+                <a:latin typeface="Consolas" panose="020B0609020204030204" pitchFamily="49" charset="0"/>
+              </a:rPr>
+              <a:t>StudentName</a:t>
+            </a:r>
+            <a:r>
+              <a:rPr lang="en-US" sz="1600" b="0" dirty="0">
+                <a:solidFill>
+                  <a:srgbClr val="000000"/>
+                </a:solidFill>
+                <a:effectLst/>
+                <a:latin typeface="Consolas" panose="020B0609020204030204" pitchFamily="49" charset="0"/>
+              </a:rPr>
+              <a:t>, </a:t>
+            </a:r>
+            <a:r>
+              <a:rPr lang="en-US" sz="1600" b="0" dirty="0" err="1">
+                <a:solidFill>
+                  <a:srgbClr val="000000"/>
+                </a:solidFill>
+                <a:effectLst/>
+                <a:latin typeface="Consolas" panose="020B0609020204030204" pitchFamily="49" charset="0"/>
+              </a:rPr>
+              <a:t>courseID</a:t>
+            </a:r>
+            <a:r>
+              <a:rPr lang="en-US" sz="1600" b="0" dirty="0">
+                <a:solidFill>
+                  <a:srgbClr val="000000"/>
+                </a:solidFill>
+                <a:effectLst/>
+                <a:latin typeface="Consolas" panose="020B0609020204030204" pitchFamily="49" charset="0"/>
+              </a:rPr>
+              <a:t>: </a:t>
+            </a:r>
+            <a:r>
+              <a:rPr lang="en-US" sz="1600" b="0" dirty="0" err="1">
+                <a:solidFill>
+                  <a:srgbClr val="000000"/>
+                </a:solidFill>
+                <a:effectLst/>
+                <a:latin typeface="Consolas" panose="020B0609020204030204" pitchFamily="49" charset="0"/>
+              </a:rPr>
+              <a:t>CourseID</a:t>
+            </a:r>
+            <a:r>
+              <a:rPr lang="en-US" sz="1600" b="0" dirty="0">
+                <a:solidFill>
+                  <a:srgbClr val="000000"/>
+                </a:solidFill>
+                <a:effectLst/>
+                <a:latin typeface="Consolas" panose="020B0609020204030204" pitchFamily="49" charset="0"/>
+              </a:rPr>
+              <a:t>): Grade</a:t>
+            </a:r>
+          </a:p>
+          <a:p>
+            <a:pPr>
+              <a:buNone/>
+            </a:pPr>
+            <a:r>
+              <a:rPr lang="en-US" sz="1600" b="0" dirty="0">
+                <a:solidFill>
+                  <a:srgbClr val="000000"/>
+                </a:solidFill>
+                <a:effectLst/>
+                <a:latin typeface="Consolas" panose="020B0609020204030204" pitchFamily="49" charset="0"/>
+              </a:rPr>
               <a:t>    </a:t>
+            </a:r>
+          </a:p>
+          <a:p>
+            <a:pPr>
+              <a:buNone/>
+            </a:pPr>
+            <a:r>
+              <a:rPr lang="en-US" sz="1600" dirty="0">
+                <a:solidFill>
+                  <a:srgbClr val="000000"/>
+                </a:solidFill>
+                <a:latin typeface="Consolas" panose="020B0609020204030204" pitchFamily="49" charset="0"/>
+              </a:rPr>
+              <a:t>    </a:t>
             </a:r>
             <a:r>
               <a:rPr lang="en-US" sz="1600" b="0" dirty="0" err="1">
@@ -13505,7 +13550,7 @@
         <p:spPr>
           <a:xfrm>
             <a:off x="838200" y="1460599"/>
-            <a:ext cx="10773578" cy="5078313"/>
+            <a:ext cx="10773578" cy="4801314"/>
           </a:xfrm>
           <a:prstGeom prst="rect">
             <a:avLst/>
@@ -13751,15 +13796,6 @@
                 <a:latin typeface="Consolas" panose="020B0609020204030204" pitchFamily="49" charset="0"/>
               </a:rPr>
             </a:br>
-            <a:br>
-              <a:rPr lang="en-US" b="0" dirty="0">
-                <a:solidFill>
-                  <a:srgbClr val="000000"/>
-                </a:solidFill>
-                <a:effectLst/>
-                <a:latin typeface="Consolas" panose="020B0609020204030204" pitchFamily="49" charset="0"/>
-              </a:rPr>
-            </a:br>
             <a:r>
               <a:rPr lang="en-US" b="0" dirty="0">
                 <a:solidFill>
@@ -14433,7 +14469,7 @@
         </p:nvGrpSpPr>
         <p:grpSpPr>
           <a:xfrm>
-            <a:off x="5651550" y="2786489"/>
+            <a:off x="5651550" y="2586073"/>
             <a:ext cx="5111827" cy="1285021"/>
             <a:chOff x="3712684" y="2558296"/>
             <a:chExt cx="5111827" cy="1285021"/>
@@ -18773,11 +18809,13 @@
         </p:nvSpPr>
         <p:spPr/>
         <p:txBody>
-          <a:bodyPr/>
+          <a:bodyPr>
+            <a:normAutofit/>
+          </a:bodyPr>
           <a:lstStyle/>
           <a:p>
             <a:r>
-              <a:rPr lang="en-US" dirty="0"/>
+              <a:rPr lang="en-US" sz="3600" dirty="0"/>
               <a:t>Now we can write some code </a:t>
             </a:r>
           </a:p>
@@ -18826,7 +18864,7 @@
         </p:nvSpPr>
         <p:spPr>
           <a:xfrm>
-            <a:off x="838199" y="1400689"/>
+            <a:off x="838200" y="1627530"/>
             <a:ext cx="10515599" cy="4426853"/>
           </a:xfrm>
           <a:prstGeom prst="rect">
@@ -20352,7 +20390,7 @@
         </p:nvSpPr>
         <p:spPr>
           <a:xfrm>
-            <a:off x="838200" y="1460599"/>
+            <a:off x="838199" y="1732057"/>
             <a:ext cx="10773578" cy="3416320"/>
           </a:xfrm>
           <a:prstGeom prst="rect">
@@ -21178,7 +21216,7 @@
         </p:nvGrpSpPr>
         <p:grpSpPr>
           <a:xfrm>
-            <a:off x="4032487" y="1229763"/>
+            <a:off x="4032487" y="1449517"/>
             <a:ext cx="5111827" cy="1285021"/>
             <a:chOff x="3712684" y="2558296"/>
             <a:chExt cx="5111827" cy="1285021"/>
@@ -21434,7 +21472,7 @@
         </p:nvSpPr>
         <p:spPr>
           <a:xfrm>
-            <a:off x="838199" y="5430917"/>
+            <a:off x="824021" y="5065792"/>
             <a:ext cx="9648463" cy="1290558"/>
           </a:xfrm>
         </p:spPr>
@@ -24529,4 +24567,10 @@
     </a:ext>
   </a:extLst>
 </a:theme>
+</file>
+
+<file path=docMetadata/LabelInfo.xml><?xml version="1.0" encoding="utf-8"?>
+<clbl:labelList xmlns:clbl="http://schemas.microsoft.com/office/2020/mipLabelMetadata">
+  <clbl:label id="{7893ce20-a697-4fd6-a4da-14011f6a471d}" enabled="1" method="Standard" siteId="{a8eec281-aaa3-4dae-ac9b-9a398b9215e7}" contentBits="0" removed="0"/>
+</clbl:labelList>
 </file>
</xml_diff>

<commit_message>
fixed string => StudentName in code on slides
</commit_message>
<xml_diff>
--- a/Slides/Module 02 From Requirements to Code.pptx
+++ b/Slides/Module 02 From Requirements to Code.pptx
@@ -1374,6 +1374,30 @@
     </pc:docChg>
   </pc:docChgLst>
   <pc:docChgLst>
+    <pc:chgData name="Mitchell Wand" userId="de9b44c55c049659" providerId="LiveId" clId="{ACA31533-D7E5-4647-92CA-20F092EE7CE8}"/>
+    <pc:docChg chg="modSld">
+      <pc:chgData name="Mitchell Wand" userId="de9b44c55c049659" providerId="LiveId" clId="{ACA31533-D7E5-4647-92CA-20F092EE7CE8}" dt="2022-08-31T01:50:01.528" v="0" actId="20577"/>
+      <pc:docMkLst>
+        <pc:docMk/>
+      </pc:docMkLst>
+      <pc:sldChg chg="modSp mod">
+        <pc:chgData name="Mitchell Wand" userId="de9b44c55c049659" providerId="LiveId" clId="{ACA31533-D7E5-4647-92CA-20F092EE7CE8}" dt="2022-08-31T01:50:01.528" v="0" actId="20577"/>
+        <pc:sldMkLst>
+          <pc:docMk/>
+          <pc:sldMk cId="3025610200" sldId="485"/>
+        </pc:sldMkLst>
+        <pc:spChg chg="mod">
+          <ac:chgData name="Mitchell Wand" userId="de9b44c55c049659" providerId="LiveId" clId="{ACA31533-D7E5-4647-92CA-20F092EE7CE8}" dt="2022-08-31T01:50:01.528" v="0" actId="20577"/>
+          <ac:spMkLst>
+            <pc:docMk/>
+            <pc:sldMk cId="3025610200" sldId="485"/>
+            <ac:spMk id="8" creationId="{5B356C44-32EB-4AC4-94B7-A86895491E70}"/>
+          </ac:spMkLst>
+        </pc:spChg>
+      </pc:sldChg>
+    </pc:docChg>
+  </pc:docChgLst>
+  <pc:docChgLst>
     <pc:chgData name="Mitchell Wand" userId="de9b44c55c049659" providerId="LiveId" clId="{2CEF4DC6-0291-4031-B743-2034250D9D86}"/>
     <pc:docChg chg="undo custSel modSld">
       <pc:chgData name="Mitchell Wand" userId="de9b44c55c049659" providerId="LiveId" clId="{2CEF4DC6-0291-4031-B743-2034250D9D86}" dt="2024-08-13T20:46:45.494" v="620" actId="20577"/>
@@ -1431,30 +1455,6 @@
       </pc:sldChg>
     </pc:docChg>
   </pc:docChgLst>
-  <pc:docChgLst>
-    <pc:chgData name="Mitchell Wand" userId="de9b44c55c049659" providerId="LiveId" clId="{ACA31533-D7E5-4647-92CA-20F092EE7CE8}"/>
-    <pc:docChg chg="modSld">
-      <pc:chgData name="Mitchell Wand" userId="de9b44c55c049659" providerId="LiveId" clId="{ACA31533-D7E5-4647-92CA-20F092EE7CE8}" dt="2022-08-31T01:50:01.528" v="0" actId="20577"/>
-      <pc:docMkLst>
-        <pc:docMk/>
-      </pc:docMkLst>
-      <pc:sldChg chg="modSp mod">
-        <pc:chgData name="Mitchell Wand" userId="de9b44c55c049659" providerId="LiveId" clId="{ACA31533-D7E5-4647-92CA-20F092EE7CE8}" dt="2022-08-31T01:50:01.528" v="0" actId="20577"/>
-        <pc:sldMkLst>
-          <pc:docMk/>
-          <pc:sldMk cId="3025610200" sldId="485"/>
-        </pc:sldMkLst>
-        <pc:spChg chg="mod">
-          <ac:chgData name="Mitchell Wand" userId="de9b44c55c049659" providerId="LiveId" clId="{ACA31533-D7E5-4647-92CA-20F092EE7CE8}" dt="2022-08-31T01:50:01.528" v="0" actId="20577"/>
-          <ac:spMkLst>
-            <pc:docMk/>
-            <pc:sldMk cId="3025610200" sldId="485"/>
-            <ac:spMk id="8" creationId="{5B356C44-32EB-4AC4-94B7-A86895491E70}"/>
-          </ac:spMkLst>
-        </pc:spChg>
-      </pc:sldChg>
-    </pc:docChg>
-  </pc:docChgLst>
 </pc:chgInfo>
 </file>
 
@@ -1540,7 +1540,7 @@
           <a:p>
             <a:fld id="{7C7E5181-6CF5-45F7-A87A-E0E0B1FD7549}" type="datetimeFigureOut">
               <a:rPr lang="en-US" smtClean="0"/>
-              <a:t>8/26/2025</a:t>
+              <a:t>9/4/2025</a:t>
             </a:fld>
             <a:endParaRPr lang="en-US"/>
           </a:p>
@@ -4781,7 +4781,7 @@
           <a:p>
             <a:fld id="{5D2A64DE-480B-420F-9649-4F8E696E08E0}" type="datetime1">
               <a:rPr lang="en-US" smtClean="0"/>
-              <a:t>8/26/2025</a:t>
+              <a:t>9/4/2025</a:t>
             </a:fld>
             <a:endParaRPr lang="en-US"/>
           </a:p>
@@ -5105,7 +5105,7 @@
           <a:p>
             <a:fld id="{EA476A42-A091-4468-A075-64A31BE59948}" type="datetime1">
               <a:rPr lang="en-US" smtClean="0"/>
-              <a:t>8/26/2025</a:t>
+              <a:t>9/4/2025</a:t>
             </a:fld>
             <a:endParaRPr lang="en-US"/>
           </a:p>
@@ -5303,7 +5303,7 @@
           <a:p>
             <a:fld id="{0D3616D0-8311-4107-9726-6B805E7D05BA}" type="datetime1">
               <a:rPr lang="en-US" smtClean="0"/>
-              <a:t>8/26/2025</a:t>
+              <a:t>9/4/2025</a:t>
             </a:fld>
             <a:endParaRPr lang="en-US"/>
           </a:p>
@@ -5511,7 +5511,7 @@
           <a:p>
             <a:fld id="{3BC2557A-5C88-417A-A763-5AC779462A5F}" type="datetime1">
               <a:rPr lang="en-US" smtClean="0"/>
-              <a:t>8/26/2025</a:t>
+              <a:t>9/4/2025</a:t>
             </a:fld>
             <a:endParaRPr lang="en-US"/>
           </a:p>
@@ -6035,7 +6035,7 @@
           <a:p>
             <a:fld id="{07C7BFD4-467E-4EDE-93EA-052F5B39A4E5}" type="datetime1">
               <a:rPr lang="en-US" smtClean="0"/>
-              <a:t>8/26/2025</a:t>
+              <a:t>9/4/2025</a:t>
             </a:fld>
             <a:endParaRPr lang="en-US"/>
           </a:p>
@@ -6285,7 +6285,7 @@
           <a:p>
             <a:fld id="{07C7BFD4-467E-4EDE-93EA-052F5B39A4E5}" type="datetime1">
               <a:rPr lang="en-US" smtClean="0"/>
-              <a:t>8/26/2025</a:t>
+              <a:t>9/4/2025</a:t>
             </a:fld>
             <a:endParaRPr lang="en-US"/>
           </a:p>
@@ -6467,7 +6467,7 @@
           <a:p>
             <a:fld id="{109E55A0-C911-4F03-82FC-7E5926047D46}" type="datetime1">
               <a:rPr lang="en-US" smtClean="0"/>
-              <a:t>8/26/2025</a:t>
+              <a:t>9/4/2025</a:t>
             </a:fld>
             <a:endParaRPr lang="en-US"/>
           </a:p>
@@ -6780,7 +6780,7 @@
           <a:p>
             <a:fld id="{A533CBE2-D5BE-47AC-ADC2-9CDFC1D0CF90}" type="datetime1">
               <a:rPr lang="en-US" smtClean="0"/>
-              <a:t>8/26/2025</a:t>
+              <a:t>9/4/2025</a:t>
             </a:fld>
             <a:endParaRPr lang="en-US"/>
           </a:p>
@@ -7081,7 +7081,7 @@
           <a:p>
             <a:fld id="{39B7EDB1-CE74-4951-85A2-0B01C2128E28}" type="datetime1">
               <a:rPr lang="en-US" smtClean="0"/>
-              <a:t>8/26/2025</a:t>
+              <a:t>9/4/2025</a:t>
             </a:fld>
             <a:endParaRPr lang="en-US"/>
           </a:p>
@@ -7529,7 +7529,7 @@
           <a:p>
             <a:fld id="{2BC7EB92-A5C2-4807-A9DC-9EDE6CBFB241}" type="datetime1">
               <a:rPr lang="en-US" smtClean="0"/>
-              <a:t>8/26/2025</a:t>
+              <a:t>9/4/2025</a:t>
             </a:fld>
             <a:endParaRPr lang="en-US"/>
           </a:p>
@@ -7642,7 +7642,7 @@
           <a:p>
             <a:fld id="{2B7B7EE0-7771-4CD5-9B2B-3550753A54A1}" type="datetime1">
               <a:rPr lang="en-US" smtClean="0"/>
-              <a:t>8/26/2025</a:t>
+              <a:t>9/4/2025</a:t>
             </a:fld>
             <a:endParaRPr lang="en-US"/>
           </a:p>
@@ -7953,7 +7953,7 @@
           <a:p>
             <a:fld id="{F8B318B3-0E87-4416-A9B8-D891968C2727}" type="datetime1">
               <a:rPr lang="en-US" smtClean="0"/>
-              <a:t>8/26/2025</a:t>
+              <a:t>9/4/2025</a:t>
             </a:fld>
             <a:endParaRPr lang="en-US"/>
           </a:p>
@@ -8194,7 +8194,7 @@
           <a:p>
             <a:fld id="{54D997E8-DDEE-43F1-8D9B-F8A1E11DE488}" type="datetime1">
               <a:rPr lang="en-US" smtClean="0"/>
-              <a:t>8/26/2025</a:t>
+              <a:t>9/4/2025</a:t>
             </a:fld>
             <a:endParaRPr lang="en-US"/>
           </a:p>
@@ -9202,7 +9202,7 @@
           <a:p>
             <a:r>
               <a:rPr lang="en-US" dirty="0"/>
-              <a:t>The client agreed that we don't have to keep track of when the student took the course)</a:t>
+              <a:t>The client agreed that we don't have to keep track of when the student took the course</a:t>
             </a:r>
           </a:p>
           <a:p>
@@ -19927,7 +19927,7 @@
               <a:buNone/>
             </a:pPr>
             <a:r>
-              <a:rPr lang="en-US" sz="2000" b="0">
+              <a:rPr lang="en-US" sz="2000" b="0" dirty="0">
                 <a:solidFill>
                   <a:srgbClr val="008000"/>
                 </a:solidFill>
@@ -19936,7 +19936,7 @@
               </a:rPr>
               <a:t>/** Adds a new student to the database</a:t>
             </a:r>
-            <a:endParaRPr lang="en-US" sz="2000" b="0">
+            <a:endParaRPr lang="en-US" sz="2000" b="0" dirty="0">
               <a:solidFill>
                 <a:srgbClr val="000000"/>
               </a:solidFill>
@@ -19949,7 +19949,7 @@
               <a:buNone/>
             </a:pPr>
             <a:r>
-              <a:rPr lang="en-US" sz="2000" b="0">
+              <a:rPr lang="en-US" sz="2000" b="0" dirty="0">
                 <a:solidFill>
                   <a:srgbClr val="008000"/>
                 </a:solidFill>
@@ -19959,7 +19959,7 @@
               <a:t>     * </a:t>
             </a:r>
             <a:r>
-              <a:rPr lang="en-US" sz="2000" b="0">
+              <a:rPr lang="en-US" sz="2000" b="0" dirty="0">
                 <a:solidFill>
                   <a:srgbClr val="0000FF"/>
                 </a:solidFill>
@@ -19969,16 +19969,56 @@
               <a:t>@param</a:t>
             </a:r>
             <a:r>
-              <a:rPr lang="en-US" sz="2000" b="0">
+              <a:rPr lang="en-US" sz="2000" b="0" dirty="0">
                 <a:solidFill>
                   <a:srgbClr val="008000"/>
                 </a:solidFill>
                 <a:effectLst/>
                 <a:latin typeface="Consolas" panose="020B0609020204030204" pitchFamily="49" charset="0"/>
               </a:rPr>
-              <a:t> {string} newName - the name of the student</a:t>
-            </a:r>
-            <a:endParaRPr lang="en-US" sz="2000" b="0">
+              <a:t> {</a:t>
+            </a:r>
+            <a:r>
+              <a:rPr lang="en-US" sz="2000" b="0" dirty="0" err="1">
+                <a:solidFill>
+                  <a:srgbClr val="008000"/>
+                </a:solidFill>
+                <a:effectLst/>
+                <a:latin typeface="Consolas" panose="020B0609020204030204" pitchFamily="49" charset="0"/>
+              </a:rPr>
+              <a:t>StudentName</a:t>
+            </a:r>
+            <a:r>
+              <a:rPr lang="en-US" sz="2000" b="0" dirty="0">
+                <a:solidFill>
+                  <a:srgbClr val="008000"/>
+                </a:solidFill>
+                <a:effectLst/>
+                <a:latin typeface="Consolas" panose="020B0609020204030204" pitchFamily="49" charset="0"/>
+              </a:rPr>
+              <a:t>} </a:t>
+            </a:r>
+            <a:r>
+              <a:rPr lang="en-US" sz="2000" b="0" dirty="0" err="1">
+                <a:solidFill>
+                  <a:srgbClr val="008000"/>
+                </a:solidFill>
+                <a:effectLst/>
+                <a:latin typeface="Consolas" panose="020B0609020204030204" pitchFamily="49" charset="0"/>
+              </a:rPr>
+              <a:t>newName</a:t>
+            </a:r>
+            <a:r>
+              <a:rPr lang="en-US" sz="2000" b="0" dirty="0">
+                <a:solidFill>
+                  <a:srgbClr val="008000"/>
+                </a:solidFill>
+                <a:effectLst/>
+                <a:latin typeface="Consolas" panose="020B0609020204030204" pitchFamily="49" charset="0"/>
+              </a:rPr>
+              <a:t> - the name of the student</a:t>
+            </a:r>
+            <a:endParaRPr lang="en-US" sz="2000" b="0" dirty="0">
               <a:solidFill>
                 <a:srgbClr val="000000"/>
               </a:solidFill>
@@ -19991,7 +20031,7 @@
               <a:buNone/>
             </a:pPr>
             <a:r>
-              <a:rPr lang="en-US" sz="2000" b="0">
+              <a:rPr lang="en-US" sz="2000" b="0" dirty="0">
                 <a:solidFill>
                   <a:srgbClr val="008000"/>
                 </a:solidFill>
@@ -20001,7 +20041,7 @@
               <a:t>     * </a:t>
             </a:r>
             <a:r>
-              <a:rPr lang="en-US" sz="2000" b="0">
+              <a:rPr lang="en-US" sz="2000" b="0" dirty="0">
                 <a:solidFill>
                   <a:srgbClr val="0000FF"/>
                 </a:solidFill>
@@ -20011,16 +20051,36 @@
               <a:t>@returns</a:t>
             </a:r>
             <a:r>
-              <a:rPr lang="en-US" sz="2000" b="0">
+              <a:rPr lang="en-US" sz="2000" b="0" dirty="0">
                 <a:solidFill>
                   <a:srgbClr val="008000"/>
                 </a:solidFill>
                 <a:effectLst/>
                 <a:latin typeface="Consolas" panose="020B0609020204030204" pitchFamily="49" charset="0"/>
               </a:rPr>
-              <a:t> {StudentID} - the newly-assigned ID for the new student</a:t>
-            </a:r>
-            <a:endParaRPr lang="en-US" sz="2000" b="0">
+              <a:t> {</a:t>
+            </a:r>
+            <a:r>
+              <a:rPr lang="en-US" sz="2000" b="0" dirty="0" err="1">
+                <a:solidFill>
+                  <a:srgbClr val="008000"/>
+                </a:solidFill>
+                <a:effectLst/>
+                <a:latin typeface="Consolas" panose="020B0609020204030204" pitchFamily="49" charset="0"/>
+              </a:rPr>
+              <a:t>StudentID</a:t>
+            </a:r>
+            <a:r>
+              <a:rPr lang="en-US" sz="2000" b="0" dirty="0">
+                <a:solidFill>
+                  <a:srgbClr val="008000"/>
+                </a:solidFill>
+                <a:effectLst/>
+                <a:latin typeface="Consolas" panose="020B0609020204030204" pitchFamily="49" charset="0"/>
+              </a:rPr>
+              <a:t>} - the newly-assigned ID for the new student</a:t>
+            </a:r>
+            <a:endParaRPr lang="en-US" sz="2000" b="0" dirty="0">
               <a:solidFill>
                 <a:srgbClr val="000000"/>
               </a:solidFill>
@@ -20033,7 +20093,7 @@
               <a:buNone/>
             </a:pPr>
             <a:r>
-              <a:rPr lang="en-US" sz="2000" b="0">
+              <a:rPr lang="en-US" sz="2000" b="0" dirty="0">
                 <a:solidFill>
                   <a:srgbClr val="008000"/>
                 </a:solidFill>
@@ -20042,7 +20102,7 @@
               </a:rPr>
               <a:t>     */</a:t>
             </a:r>
-            <a:endParaRPr lang="en-US" sz="2000" b="0">
+            <a:endParaRPr lang="en-US" sz="2000" b="0" dirty="0">
               <a:solidFill>
                 <a:srgbClr val="000000"/>
               </a:solidFill>
@@ -20055,14 +20115,94 @@
               <a:buNone/>
             </a:pPr>
             <a:r>
-              <a:rPr lang="en-US" sz="2000" b="0">
-                <a:solidFill>
-                  <a:srgbClr val="000000"/>
-                </a:solidFill>
-                <a:effectLst/>
-                <a:latin typeface="Consolas" panose="020B0609020204030204" pitchFamily="49" charset="0"/>
-              </a:rPr>
-              <a:t>    addStudent(newName: string): StudentID {</a:t>
+              <a:rPr lang="en-US" sz="2000" b="0" dirty="0">
+                <a:solidFill>
+                  <a:srgbClr val="000000"/>
+                </a:solidFill>
+                <a:effectLst/>
+                <a:latin typeface="Consolas" panose="020B0609020204030204" pitchFamily="49" charset="0"/>
+              </a:rPr>
+              <a:t>    </a:t>
+            </a:r>
+            <a:r>
+              <a:rPr lang="en-US" sz="2000" b="0" dirty="0" err="1">
+                <a:solidFill>
+                  <a:srgbClr val="000000"/>
+                </a:solidFill>
+                <a:effectLst/>
+                <a:latin typeface="Consolas" panose="020B0609020204030204" pitchFamily="49" charset="0"/>
+              </a:rPr>
+              <a:t>addStudent</a:t>
+            </a:r>
+            <a:r>
+              <a:rPr lang="en-US" sz="2000" b="0" dirty="0">
+                <a:solidFill>
+                  <a:srgbClr val="000000"/>
+                </a:solidFill>
+                <a:effectLst/>
+                <a:latin typeface="Consolas" panose="020B0609020204030204" pitchFamily="49" charset="0"/>
+              </a:rPr>
+              <a:t>(</a:t>
+            </a:r>
+            <a:r>
+              <a:rPr lang="en-US" sz="2000" b="0" dirty="0" err="1">
+                <a:solidFill>
+                  <a:srgbClr val="000000"/>
+                </a:solidFill>
+                <a:effectLst/>
+                <a:latin typeface="Consolas" panose="020B0609020204030204" pitchFamily="49" charset="0"/>
+              </a:rPr>
+              <a:t>newName</a:t>
+            </a:r>
+            <a:r>
+              <a:rPr lang="en-US" sz="2000" b="0" dirty="0">
+                <a:solidFill>
+                  <a:srgbClr val="000000"/>
+                </a:solidFill>
+                <a:effectLst/>
+                <a:latin typeface="Consolas" panose="020B0609020204030204" pitchFamily="49" charset="0"/>
+              </a:rPr>
+              <a:t>: </a:t>
+            </a:r>
+            <a:r>
+              <a:rPr lang="en-US" sz="2000" b="0" dirty="0" err="1">
+                <a:solidFill>
+                  <a:srgbClr val="000000"/>
+                </a:solidFill>
+                <a:effectLst/>
+                <a:latin typeface="Consolas" panose="020B0609020204030204" pitchFamily="49" charset="0"/>
+              </a:rPr>
+              <a:t>StudentName</a:t>
+            </a:r>
+            <a:r>
+              <a:rPr lang="en-US" sz="2000" b="0" dirty="0">
+                <a:solidFill>
+                  <a:srgbClr val="000000"/>
+                </a:solidFill>
+                <a:effectLst/>
+                <a:latin typeface="Consolas" panose="020B0609020204030204" pitchFamily="49" charset="0"/>
+              </a:rPr>
+              <a:t>): </a:t>
+            </a:r>
+            <a:r>
+              <a:rPr lang="en-US" sz="2000" b="0" dirty="0" err="1">
+                <a:solidFill>
+                  <a:srgbClr val="000000"/>
+                </a:solidFill>
+                <a:effectLst/>
+                <a:latin typeface="Consolas" panose="020B0609020204030204" pitchFamily="49" charset="0"/>
+              </a:rPr>
+              <a:t>StudentID</a:t>
+            </a:r>
+            <a:r>
+              <a:rPr lang="en-US" sz="2000" b="0" dirty="0">
+                <a:solidFill>
+                  <a:srgbClr val="000000"/>
+                </a:solidFill>
+                <a:effectLst/>
+                <a:latin typeface="Consolas" panose="020B0609020204030204" pitchFamily="49" charset="0"/>
+              </a:rPr>
+              <a:t> {</a:t>
             </a:r>
           </a:p>
           <a:p>
@@ -20070,7 +20210,7 @@
               <a:buNone/>
             </a:pPr>
             <a:r>
-              <a:rPr lang="en-US" sz="2000" b="0">
+              <a:rPr lang="en-US" sz="2000" b="0" dirty="0">
                 <a:solidFill>
                   <a:srgbClr val="000000"/>
                 </a:solidFill>
@@ -20080,7 +20220,7 @@
               <a:t>        </a:t>
             </a:r>
             <a:r>
-              <a:rPr lang="en-US" sz="2000" b="0">
+              <a:rPr lang="en-US" sz="2000" b="0" dirty="0">
                 <a:solidFill>
                   <a:srgbClr val="0000FF"/>
                 </a:solidFill>
@@ -20090,17 +20230,57 @@
               <a:t>const</a:t>
             </a:r>
             <a:r>
-              <a:rPr lang="en-US" sz="2000" b="0">
-                <a:solidFill>
-                  <a:srgbClr val="000000"/>
-                </a:solidFill>
-                <a:effectLst/>
-                <a:latin typeface="Consolas" panose="020B0609020204030204" pitchFamily="49" charset="0"/>
-              </a:rPr>
-              <a:t> newID: StudentID = </a:t>
-            </a:r>
-            <a:r>
-              <a:rPr lang="en-US" sz="2000" b="0">
+              <a:rPr lang="en-US" sz="2000" b="0" dirty="0">
+                <a:solidFill>
+                  <a:srgbClr val="000000"/>
+                </a:solidFill>
+                <a:effectLst/>
+                <a:latin typeface="Consolas" panose="020B0609020204030204" pitchFamily="49" charset="0"/>
+              </a:rPr>
+              <a:t> </a:t>
+            </a:r>
+            <a:r>
+              <a:rPr lang="en-US" sz="2000" b="0" dirty="0" err="1">
+                <a:solidFill>
+                  <a:srgbClr val="000000"/>
+                </a:solidFill>
+                <a:effectLst/>
+                <a:latin typeface="Consolas" panose="020B0609020204030204" pitchFamily="49" charset="0"/>
+              </a:rPr>
+              <a:t>newID</a:t>
+            </a:r>
+            <a:r>
+              <a:rPr lang="en-US" sz="2000" b="0" dirty="0">
+                <a:solidFill>
+                  <a:srgbClr val="000000"/>
+                </a:solidFill>
+                <a:effectLst/>
+                <a:latin typeface="Consolas" panose="020B0609020204030204" pitchFamily="49" charset="0"/>
+              </a:rPr>
+              <a:t>: </a:t>
+            </a:r>
+            <a:r>
+              <a:rPr lang="en-US" sz="2000" b="0" dirty="0" err="1">
+                <a:solidFill>
+                  <a:srgbClr val="000000"/>
+                </a:solidFill>
+                <a:effectLst/>
+                <a:latin typeface="Consolas" panose="020B0609020204030204" pitchFamily="49" charset="0"/>
+              </a:rPr>
+              <a:t>StudentID</a:t>
+            </a:r>
+            <a:r>
+              <a:rPr lang="en-US" sz="2000" b="0" dirty="0">
+                <a:solidFill>
+                  <a:srgbClr val="000000"/>
+                </a:solidFill>
+                <a:effectLst/>
+                <a:latin typeface="Consolas" panose="020B0609020204030204" pitchFamily="49" charset="0"/>
+              </a:rPr>
+              <a:t> = </a:t>
+            </a:r>
+            <a:r>
+              <a:rPr lang="en-US" sz="2000" b="0" dirty="0" err="1">
                 <a:solidFill>
                   <a:srgbClr val="0000FF"/>
                 </a:solidFill>
@@ -20110,14 +20290,24 @@
               <a:t>this</a:t>
             </a:r>
             <a:r>
-              <a:rPr lang="en-US" sz="2000" b="0">
-                <a:solidFill>
-                  <a:srgbClr val="000000"/>
-                </a:solidFill>
-                <a:effectLst/>
-                <a:latin typeface="Consolas" panose="020B0609020204030204" pitchFamily="49" charset="0"/>
-              </a:rPr>
-              <a:t>.nextID()</a:t>
+              <a:rPr lang="en-US" sz="2000" b="0" dirty="0" err="1">
+                <a:solidFill>
+                  <a:srgbClr val="000000"/>
+                </a:solidFill>
+                <a:effectLst/>
+                <a:latin typeface="Consolas" panose="020B0609020204030204" pitchFamily="49" charset="0"/>
+              </a:rPr>
+              <a:t>.nextID</a:t>
+            </a:r>
+            <a:r>
+              <a:rPr lang="en-US" sz="2000" b="0" dirty="0">
+                <a:solidFill>
+                  <a:srgbClr val="000000"/>
+                </a:solidFill>
+                <a:effectLst/>
+                <a:latin typeface="Consolas" panose="020B0609020204030204" pitchFamily="49" charset="0"/>
+              </a:rPr>
+              <a:t>()</a:t>
             </a:r>
           </a:p>
           <a:p>
@@ -20125,7 +20315,7 @@
               <a:buNone/>
             </a:pPr>
             <a:r>
-              <a:rPr lang="en-US" sz="2000" b="0">
+              <a:rPr lang="en-US" sz="2000" b="0" dirty="0">
                 <a:solidFill>
                   <a:srgbClr val="000000"/>
                 </a:solidFill>
@@ -20135,7 +20325,7 @@
               <a:t>        </a:t>
             </a:r>
             <a:r>
-              <a:rPr lang="en-US" sz="2000" b="0">
+              <a:rPr lang="en-US" sz="2000" b="0" dirty="0">
                 <a:solidFill>
                   <a:srgbClr val="0000FF"/>
                 </a:solidFill>
@@ -20145,14 +20335,34 @@
               <a:t>const</a:t>
             </a:r>
             <a:r>
-              <a:rPr lang="en-US" sz="2000" b="0">
-                <a:solidFill>
-                  <a:srgbClr val="000000"/>
-                </a:solidFill>
-                <a:effectLst/>
-                <a:latin typeface="Consolas" panose="020B0609020204030204" pitchFamily="49" charset="0"/>
-              </a:rPr>
-              <a:t> newTranscript: Transcript = {</a:t>
+              <a:rPr lang="en-US" sz="2000" b="0" dirty="0">
+                <a:solidFill>
+                  <a:srgbClr val="000000"/>
+                </a:solidFill>
+                <a:effectLst/>
+                <a:latin typeface="Consolas" panose="020B0609020204030204" pitchFamily="49" charset="0"/>
+              </a:rPr>
+              <a:t> </a:t>
+            </a:r>
+            <a:r>
+              <a:rPr lang="en-US" sz="2000" b="0" dirty="0" err="1">
+                <a:solidFill>
+                  <a:srgbClr val="000000"/>
+                </a:solidFill>
+                <a:effectLst/>
+                <a:latin typeface="Consolas" panose="020B0609020204030204" pitchFamily="49" charset="0"/>
+              </a:rPr>
+              <a:t>newTranscript</a:t>
+            </a:r>
+            <a:r>
+              <a:rPr lang="en-US" sz="2000" b="0" dirty="0">
+                <a:solidFill>
+                  <a:srgbClr val="000000"/>
+                </a:solidFill>
+                <a:effectLst/>
+                <a:latin typeface="Consolas" panose="020B0609020204030204" pitchFamily="49" charset="0"/>
+              </a:rPr>
+              <a:t>: Transcript = {</a:t>
             </a:r>
           </a:p>
           <a:p>
@@ -20160,14 +20370,54 @@
               <a:buNone/>
             </a:pPr>
             <a:r>
-              <a:rPr lang="en-US" sz="2000" b="0">
-                <a:solidFill>
-                  <a:srgbClr val="000000"/>
-                </a:solidFill>
-                <a:effectLst/>
-                <a:latin typeface="Consolas" panose="020B0609020204030204" pitchFamily="49" charset="0"/>
-              </a:rPr>
-              <a:t>            studentID: newID,</a:t>
+              <a:rPr lang="en-US" sz="2000" b="0" dirty="0">
+                <a:solidFill>
+                  <a:srgbClr val="000000"/>
+                </a:solidFill>
+                <a:effectLst/>
+                <a:latin typeface="Consolas" panose="020B0609020204030204" pitchFamily="49" charset="0"/>
+              </a:rPr>
+              <a:t>            </a:t>
+            </a:r>
+            <a:r>
+              <a:rPr lang="en-US" sz="2000" b="0" dirty="0" err="1">
+                <a:solidFill>
+                  <a:srgbClr val="000000"/>
+                </a:solidFill>
+                <a:effectLst/>
+                <a:latin typeface="Consolas" panose="020B0609020204030204" pitchFamily="49" charset="0"/>
+              </a:rPr>
+              <a:t>studentID</a:t>
+            </a:r>
+            <a:r>
+              <a:rPr lang="en-US" sz="2000" b="0" dirty="0">
+                <a:solidFill>
+                  <a:srgbClr val="000000"/>
+                </a:solidFill>
+                <a:effectLst/>
+                <a:latin typeface="Consolas" panose="020B0609020204030204" pitchFamily="49" charset="0"/>
+              </a:rPr>
+              <a:t>: </a:t>
+            </a:r>
+            <a:r>
+              <a:rPr lang="en-US" sz="2000" b="0" dirty="0" err="1">
+                <a:solidFill>
+                  <a:srgbClr val="000000"/>
+                </a:solidFill>
+                <a:effectLst/>
+                <a:latin typeface="Consolas" panose="020B0609020204030204" pitchFamily="49" charset="0"/>
+              </a:rPr>
+              <a:t>newID</a:t>
+            </a:r>
+            <a:r>
+              <a:rPr lang="en-US" sz="2000" b="0" dirty="0">
+                <a:solidFill>
+                  <a:srgbClr val="000000"/>
+                </a:solidFill>
+                <a:effectLst/>
+                <a:latin typeface="Consolas" panose="020B0609020204030204" pitchFamily="49" charset="0"/>
+              </a:rPr>
+              <a:t>,</a:t>
             </a:r>
           </a:p>
           <a:p>
@@ -20175,14 +20425,54 @@
               <a:buNone/>
             </a:pPr>
             <a:r>
-              <a:rPr lang="en-US" sz="2000" b="0">
-                <a:solidFill>
-                  <a:srgbClr val="000000"/>
-                </a:solidFill>
-                <a:effectLst/>
-                <a:latin typeface="Consolas" panose="020B0609020204030204" pitchFamily="49" charset="0"/>
-              </a:rPr>
-              <a:t>            studentName: newName,</a:t>
+              <a:rPr lang="en-US" sz="2000" b="0" dirty="0">
+                <a:solidFill>
+                  <a:srgbClr val="000000"/>
+                </a:solidFill>
+                <a:effectLst/>
+                <a:latin typeface="Consolas" panose="020B0609020204030204" pitchFamily="49" charset="0"/>
+              </a:rPr>
+              <a:t>            </a:t>
+            </a:r>
+            <a:r>
+              <a:rPr lang="en-US" sz="2000" b="0" dirty="0" err="1">
+                <a:solidFill>
+                  <a:srgbClr val="000000"/>
+                </a:solidFill>
+                <a:effectLst/>
+                <a:latin typeface="Consolas" panose="020B0609020204030204" pitchFamily="49" charset="0"/>
+              </a:rPr>
+              <a:t>studentName</a:t>
+            </a:r>
+            <a:r>
+              <a:rPr lang="en-US" sz="2000" b="0" dirty="0">
+                <a:solidFill>
+                  <a:srgbClr val="000000"/>
+                </a:solidFill>
+                <a:effectLst/>
+                <a:latin typeface="Consolas" panose="020B0609020204030204" pitchFamily="49" charset="0"/>
+              </a:rPr>
+              <a:t>: </a:t>
+            </a:r>
+            <a:r>
+              <a:rPr lang="en-US" sz="2000" b="0" dirty="0" err="1">
+                <a:solidFill>
+                  <a:srgbClr val="000000"/>
+                </a:solidFill>
+                <a:effectLst/>
+                <a:latin typeface="Consolas" panose="020B0609020204030204" pitchFamily="49" charset="0"/>
+              </a:rPr>
+              <a:t>newName</a:t>
+            </a:r>
+            <a:r>
+              <a:rPr lang="en-US" sz="2000" b="0" dirty="0">
+                <a:solidFill>
+                  <a:srgbClr val="000000"/>
+                </a:solidFill>
+                <a:effectLst/>
+                <a:latin typeface="Consolas" panose="020B0609020204030204" pitchFamily="49" charset="0"/>
+              </a:rPr>
+              <a:t>,</a:t>
             </a:r>
           </a:p>
           <a:p>
@@ -20190,7 +20480,7 @@
               <a:buNone/>
             </a:pPr>
             <a:r>
-              <a:rPr lang="en-US" sz="2000" b="0">
+              <a:rPr lang="en-US" sz="2000" b="0" dirty="0">
                 <a:solidFill>
                   <a:srgbClr val="000000"/>
                 </a:solidFill>
@@ -20200,7 +20490,7 @@
               <a:t>            courses: [] </a:t>
             </a:r>
             <a:r>
-              <a:rPr lang="en-US" sz="2000" b="0">
+              <a:rPr lang="en-US" sz="2000" b="0" dirty="0">
                 <a:solidFill>
                   <a:srgbClr val="008000"/>
                 </a:solidFill>
@@ -20209,7 +20499,7 @@
               </a:rPr>
               <a:t>// initially no courses</a:t>
             </a:r>
-            <a:endParaRPr lang="en-US" sz="2000" b="0">
+            <a:endParaRPr lang="en-US" sz="2000" b="0" dirty="0">
               <a:solidFill>
                 <a:srgbClr val="000000"/>
               </a:solidFill>
@@ -20222,7 +20512,7 @@
               <a:buNone/>
             </a:pPr>
             <a:r>
-              <a:rPr lang="en-US" sz="2000" b="0">
+              <a:rPr lang="en-US" sz="2000" b="0" dirty="0">
                 <a:solidFill>
                   <a:srgbClr val="000000"/>
                 </a:solidFill>
@@ -20237,7 +20527,7 @@
               <a:buNone/>
             </a:pPr>
             <a:r>
-              <a:rPr lang="en-US" sz="2000" b="0">
+              <a:rPr lang="en-US" sz="2000" b="0" dirty="0">
                 <a:solidFill>
                   <a:srgbClr val="000000"/>
                 </a:solidFill>
@@ -20247,7 +20537,7 @@
               <a:t>        </a:t>
             </a:r>
             <a:r>
-              <a:rPr lang="en-US" sz="2000" b="0">
+              <a:rPr lang="en-US" sz="2000" b="0" dirty="0" err="1">
                 <a:solidFill>
                   <a:srgbClr val="0000FF"/>
                 </a:solidFill>
@@ -20257,14 +20547,44 @@
               <a:t>this</a:t>
             </a:r>
             <a:r>
-              <a:rPr lang="en-US" sz="2000" b="0">
-                <a:solidFill>
-                  <a:srgbClr val="000000"/>
-                </a:solidFill>
-                <a:effectLst/>
-                <a:latin typeface="Consolas" panose="020B0609020204030204" pitchFamily="49" charset="0"/>
-              </a:rPr>
-              <a:t>.transcripts.push(newTranscript)</a:t>
+              <a:rPr lang="en-US" sz="2000" b="0" dirty="0" err="1">
+                <a:solidFill>
+                  <a:srgbClr val="000000"/>
+                </a:solidFill>
+                <a:effectLst/>
+                <a:latin typeface="Consolas" panose="020B0609020204030204" pitchFamily="49" charset="0"/>
+              </a:rPr>
+              <a:t>.transcripts.push</a:t>
+            </a:r>
+            <a:r>
+              <a:rPr lang="en-US" sz="2000" b="0" dirty="0">
+                <a:solidFill>
+                  <a:srgbClr val="000000"/>
+                </a:solidFill>
+                <a:effectLst/>
+                <a:latin typeface="Consolas" panose="020B0609020204030204" pitchFamily="49" charset="0"/>
+              </a:rPr>
+              <a:t>(</a:t>
+            </a:r>
+            <a:r>
+              <a:rPr lang="en-US" sz="2000" b="0" dirty="0" err="1">
+                <a:solidFill>
+                  <a:srgbClr val="000000"/>
+                </a:solidFill>
+                <a:effectLst/>
+                <a:latin typeface="Consolas" panose="020B0609020204030204" pitchFamily="49" charset="0"/>
+              </a:rPr>
+              <a:t>newTranscript</a:t>
+            </a:r>
+            <a:r>
+              <a:rPr lang="en-US" sz="2000" b="0" dirty="0">
+                <a:solidFill>
+                  <a:srgbClr val="000000"/>
+                </a:solidFill>
+                <a:effectLst/>
+                <a:latin typeface="Consolas" panose="020B0609020204030204" pitchFamily="49" charset="0"/>
+              </a:rPr>
+              <a:t>)</a:t>
             </a:r>
           </a:p>
           <a:p>
@@ -20272,7 +20592,7 @@
               <a:buNone/>
             </a:pPr>
             <a:r>
-              <a:rPr lang="en-US" sz="2000" b="0">
+              <a:rPr lang="en-US" sz="2000" b="0" dirty="0">
                 <a:solidFill>
                   <a:srgbClr val="000000"/>
                 </a:solidFill>
@@ -20282,7 +20602,7 @@
               <a:t>        </a:t>
             </a:r>
             <a:r>
-              <a:rPr lang="en-US" sz="2000" b="0">
+              <a:rPr lang="en-US" sz="2000" b="0" dirty="0">
                 <a:solidFill>
                   <a:srgbClr val="0000FF"/>
                 </a:solidFill>
@@ -20292,22 +20612,39 @@
               <a:t>return</a:t>
             </a:r>
             <a:r>
-              <a:rPr lang="en-US" sz="2000" b="0">
-                <a:solidFill>
-                  <a:srgbClr val="000000"/>
-                </a:solidFill>
-                <a:effectLst/>
-                <a:latin typeface="Consolas" panose="020B0609020204030204" pitchFamily="49" charset="0"/>
-              </a:rPr>
-              <a:t> newID</a:t>
-            </a:r>
+              <a:rPr lang="en-US" sz="2000" b="0" dirty="0">
+                <a:solidFill>
+                  <a:srgbClr val="000000"/>
+                </a:solidFill>
+                <a:effectLst/>
+                <a:latin typeface="Consolas" panose="020B0609020204030204" pitchFamily="49" charset="0"/>
+              </a:rPr>
+              <a:t> </a:t>
+            </a:r>
+            <a:r>
+              <a:rPr lang="en-US" sz="2000" b="0" dirty="0" err="1">
+                <a:solidFill>
+                  <a:srgbClr val="000000"/>
+                </a:solidFill>
+                <a:effectLst/>
+                <a:latin typeface="Consolas" panose="020B0609020204030204" pitchFamily="49" charset="0"/>
+              </a:rPr>
+              <a:t>newID</a:t>
+            </a:r>
+            <a:endParaRPr lang="en-US" sz="2000" b="0" dirty="0">
+              <a:solidFill>
+                <a:srgbClr val="000000"/>
+              </a:solidFill>
+              <a:effectLst/>
+              <a:latin typeface="Consolas" panose="020B0609020204030204" pitchFamily="49" charset="0"/>
+            </a:endParaRPr>
           </a:p>
           <a:p>
             <a:pPr>
               <a:buNone/>
             </a:pPr>
             <a:r>
-              <a:rPr lang="en-US" sz="2000" b="0">
+              <a:rPr lang="en-US" sz="2000" b="0" dirty="0">
                 <a:solidFill>
                   <a:srgbClr val="000000"/>
                 </a:solidFill>
@@ -20319,7 +20656,7 @@
           </a:p>
           <a:p>
             <a:br>
-              <a:rPr lang="en-US" sz="2000" b="0">
+              <a:rPr lang="en-US" sz="2000" b="0" dirty="0">
                 <a:solidFill>
                   <a:srgbClr val="000000"/>
                 </a:solidFill>
@@ -20328,7 +20665,7 @@
               </a:rPr>
             </a:br>
             <a:br>
-              <a:rPr lang="en-US" sz="2000" b="0">
+              <a:rPr lang="en-US" sz="2000" b="0" dirty="0">
                 <a:solidFill>
                   <a:srgbClr val="000000"/>
                 </a:solidFill>
@@ -20336,7 +20673,7 @@
                 <a:latin typeface="Consolas" panose="020B0609020204030204" pitchFamily="49" charset="0"/>
               </a:rPr>
             </a:br>
-            <a:endParaRPr lang="en-US" sz="2000" b="0">
+            <a:endParaRPr lang="en-US" sz="2000" b="0" dirty="0">
               <a:solidFill>
                 <a:srgbClr val="000000"/>
               </a:solidFill>

</xml_diff>